<commit_message>
Presentation Performance slide update
</commit_message>
<xml_diff>
--- a/Presentations/session5.pptx
+++ b/Presentations/session5.pptx
@@ -5,7 +5,7 @@
     <p:sldMasterId id="2147483648" r:id="rId1"/>
   </p:sldMasterIdLst>
   <p:notesMasterIdLst>
-    <p:notesMasterId r:id="rId8"/>
+    <p:notesMasterId r:id="rId9"/>
   </p:notesMasterIdLst>
   <p:sldIdLst>
     <p:sldId id="256" r:id="rId2"/>
@@ -14,6 +14,7 @@
     <p:sldId id="262" r:id="rId5"/>
     <p:sldId id="261" r:id="rId6"/>
     <p:sldId id="263" r:id="rId7"/>
+    <p:sldId id="264" r:id="rId8"/>
   </p:sldIdLst>
   <p:sldSz cx="12192000" cy="6858000"/>
   <p:notesSz cx="6858000" cy="9144000"/>
@@ -202,7 +203,7 @@
           <a:p>
             <a:fld id="{2F91C706-E70F-46EA-8710-ED14C8B4D1F4}" type="datetimeFigureOut">
               <a:rPr lang="de-AT" smtClean="0"/>
-              <a:t>15.10.2023</a:t>
+              <a:t>16.10.2023</a:t>
             </a:fld>
             <a:endParaRPr lang="de-AT"/>
           </a:p>
@@ -706,7 +707,7 @@
           <a:p>
             <a:fld id="{FDFC82F5-4BEC-4C6D-AC7E-0EBE1A7D0913}" type="datetimeFigureOut">
               <a:rPr lang="en-GB" smtClean="0"/>
-              <a:t>15/10/2023</a:t>
+              <a:t>16/10/2023</a:t>
             </a:fld>
             <a:endParaRPr lang="en-GB"/>
           </a:p>
@@ -886,7 +887,7 @@
           <a:p>
             <a:fld id="{FDFC82F5-4BEC-4C6D-AC7E-0EBE1A7D0913}" type="datetimeFigureOut">
               <a:rPr lang="en-GB" smtClean="0"/>
-              <a:t>15/10/2023</a:t>
+              <a:t>16/10/2023</a:t>
             </a:fld>
             <a:endParaRPr lang="en-GB"/>
           </a:p>
@@ -1056,7 +1057,7 @@
           <a:p>
             <a:fld id="{FDFC82F5-4BEC-4C6D-AC7E-0EBE1A7D0913}" type="datetimeFigureOut">
               <a:rPr lang="en-GB" smtClean="0"/>
-              <a:t>15/10/2023</a:t>
+              <a:t>16/10/2023</a:t>
             </a:fld>
             <a:endParaRPr lang="en-GB"/>
           </a:p>
@@ -1302,7 +1303,7 @@
           <a:p>
             <a:fld id="{FDFC82F5-4BEC-4C6D-AC7E-0EBE1A7D0913}" type="datetimeFigureOut">
               <a:rPr lang="en-GB" smtClean="0"/>
-              <a:t>15/10/2023</a:t>
+              <a:t>16/10/2023</a:t>
             </a:fld>
             <a:endParaRPr lang="en-GB"/>
           </a:p>
@@ -1534,7 +1535,7 @@
           <a:p>
             <a:fld id="{FDFC82F5-4BEC-4C6D-AC7E-0EBE1A7D0913}" type="datetimeFigureOut">
               <a:rPr lang="en-GB" smtClean="0"/>
-              <a:t>15/10/2023</a:t>
+              <a:t>16/10/2023</a:t>
             </a:fld>
             <a:endParaRPr lang="en-GB"/>
           </a:p>
@@ -1901,7 +1902,7 @@
           <a:p>
             <a:fld id="{FDFC82F5-4BEC-4C6D-AC7E-0EBE1A7D0913}" type="datetimeFigureOut">
               <a:rPr lang="en-GB" smtClean="0"/>
-              <a:t>15/10/2023</a:t>
+              <a:t>16/10/2023</a:t>
             </a:fld>
             <a:endParaRPr lang="en-GB"/>
           </a:p>
@@ -2019,7 +2020,7 @@
           <a:p>
             <a:fld id="{FDFC82F5-4BEC-4C6D-AC7E-0EBE1A7D0913}" type="datetimeFigureOut">
               <a:rPr lang="en-GB" smtClean="0"/>
-              <a:t>15/10/2023</a:t>
+              <a:t>16/10/2023</a:t>
             </a:fld>
             <a:endParaRPr lang="en-GB"/>
           </a:p>
@@ -2114,7 +2115,7 @@
           <a:p>
             <a:fld id="{FDFC82F5-4BEC-4C6D-AC7E-0EBE1A7D0913}" type="datetimeFigureOut">
               <a:rPr lang="en-GB" smtClean="0"/>
-              <a:t>15/10/2023</a:t>
+              <a:t>16/10/2023</a:t>
             </a:fld>
             <a:endParaRPr lang="en-GB"/>
           </a:p>
@@ -2391,7 +2392,7 @@
           <a:p>
             <a:fld id="{FDFC82F5-4BEC-4C6D-AC7E-0EBE1A7D0913}" type="datetimeFigureOut">
               <a:rPr lang="en-GB" smtClean="0"/>
-              <a:t>15/10/2023</a:t>
+              <a:t>16/10/2023</a:t>
             </a:fld>
             <a:endParaRPr lang="en-GB"/>
           </a:p>
@@ -2644,7 +2645,7 @@
           <a:p>
             <a:fld id="{FDFC82F5-4BEC-4C6D-AC7E-0EBE1A7D0913}" type="datetimeFigureOut">
               <a:rPr lang="en-GB" smtClean="0"/>
-              <a:t>15/10/2023</a:t>
+              <a:t>16/10/2023</a:t>
             </a:fld>
             <a:endParaRPr lang="en-GB"/>
           </a:p>
@@ -2857,7 +2858,7 @@
           <a:p>
             <a:fld id="{FDFC82F5-4BEC-4C6D-AC7E-0EBE1A7D0913}" type="datetimeFigureOut">
               <a:rPr lang="en-GB" smtClean="0"/>
-              <a:t>15/10/2023</a:t>
+              <a:t>16/10/2023</a:t>
             </a:fld>
             <a:endParaRPr lang="en-GB"/>
           </a:p>
@@ -4150,7 +4151,7 @@
         </p:blipFill>
         <p:spPr>
           <a:xfrm>
-            <a:off x="838200" y="1825625"/>
+            <a:off x="1654945" y="1825625"/>
             <a:ext cx="8456761" cy="4351338"/>
           </a:xfrm>
           <a:prstGeom prst="rect">
@@ -4162,6 +4163,316 @@
     <p:extLst>
       <p:ext uri="{BB962C8B-B14F-4D97-AF65-F5344CB8AC3E}">
         <p14:creationId xmlns:p14="http://schemas.microsoft.com/office/powerpoint/2010/main" val="2298223960"/>
+      </p:ext>
+    </p:extLst>
+  </p:cSld>
+  <p:clrMapOvr>
+    <a:masterClrMapping/>
+  </p:clrMapOvr>
+</p:sld>
+</file>
+
+<file path=ppt/slides/slide7.xml><?xml version="1.0" encoding="utf-8"?>
+<p:sld xmlns:a="http://schemas.openxmlformats.org/drawingml/2006/main" xmlns:r="http://schemas.openxmlformats.org/officeDocument/2006/relationships" xmlns:p="http://schemas.openxmlformats.org/presentationml/2006/main">
+  <p:cSld>
+    <p:spTree>
+      <p:nvGrpSpPr>
+        <p:cNvPr id="1" name=""/>
+        <p:cNvGrpSpPr/>
+        <p:nvPr/>
+      </p:nvGrpSpPr>
+      <p:grpSpPr>
+        <a:xfrm>
+          <a:off x="0" y="0"/>
+          <a:ext cx="0" cy="0"/>
+          <a:chOff x="0" y="0"/>
+          <a:chExt cx="0" cy="0"/>
+        </a:xfrm>
+      </p:grpSpPr>
+      <p:sp>
+        <p:nvSpPr>
+          <p:cNvPr id="2" name="Titel 1">
+            <a:extLst>
+              <a:ext uri="{FF2B5EF4-FFF2-40B4-BE49-F238E27FC236}">
+                <a16:creationId xmlns:a16="http://schemas.microsoft.com/office/drawing/2014/main" id="{7F72643E-2CB7-9CCA-906B-9B982E68B153}"/>
+              </a:ext>
+            </a:extLst>
+          </p:cNvPr>
+          <p:cNvSpPr>
+            <a:spLocks noGrp="1"/>
+          </p:cNvSpPr>
+          <p:nvPr>
+            <p:ph type="title"/>
+          </p:nvPr>
+        </p:nvSpPr>
+        <p:spPr/>
+        <p:txBody>
+          <a:bodyPr/>
+          <a:lstStyle/>
+          <a:p>
+            <a:r>
+              <a:rPr lang="de-DE" dirty="0"/>
+              <a:t>Performance</a:t>
+            </a:r>
+            <a:endParaRPr lang="de-AT" dirty="0"/>
+          </a:p>
+        </p:txBody>
+      </p:sp>
+      <p:sp>
+        <p:nvSpPr>
+          <p:cNvPr id="3" name="Inhaltsplatzhalter 2">
+            <a:extLst>
+              <a:ext uri="{FF2B5EF4-FFF2-40B4-BE49-F238E27FC236}">
+                <a16:creationId xmlns:a16="http://schemas.microsoft.com/office/drawing/2014/main" id="{CCDDC1E8-C057-5369-176C-C475247A7C91}"/>
+              </a:ext>
+            </a:extLst>
+          </p:cNvPr>
+          <p:cNvSpPr>
+            <a:spLocks noGrp="1"/>
+          </p:cNvSpPr>
+          <p:nvPr>
+            <p:ph idx="1"/>
+          </p:nvPr>
+        </p:nvSpPr>
+        <p:spPr>
+          <a:xfrm>
+            <a:off x="5068957" y="1825625"/>
+            <a:ext cx="6301407" cy="4351338"/>
+          </a:xfrm>
+        </p:spPr>
+        <p:txBody>
+          <a:bodyPr/>
+          <a:lstStyle/>
+          <a:p>
+            <a:r>
+              <a:rPr lang="de-DE" dirty="0" err="1"/>
+              <a:t>Macro</a:t>
+            </a:r>
+            <a:r>
+              <a:rPr lang="de-DE" dirty="0"/>
+              <a:t> </a:t>
+            </a:r>
+            <a:r>
+              <a:rPr lang="de-DE" dirty="0" err="1"/>
+              <a:t>average</a:t>
+            </a:r>
+            <a:r>
+              <a:rPr lang="de-DE" dirty="0"/>
+              <a:t> </a:t>
+            </a:r>
+            <a:r>
+              <a:rPr lang="de-DE" dirty="0" err="1"/>
+              <a:t>is</a:t>
+            </a:r>
+            <a:r>
+              <a:rPr lang="de-DE" dirty="0"/>
+              <a:t> </a:t>
+            </a:r>
+            <a:r>
+              <a:rPr lang="de-DE" dirty="0" err="1"/>
+              <a:t>poor</a:t>
+            </a:r>
+            <a:endParaRPr lang="de-DE" dirty="0"/>
+          </a:p>
+          <a:p>
+            <a:pPr lvl="1"/>
+            <a:r>
+              <a:rPr lang="de-DE" dirty="0"/>
+              <a:t>Performance </a:t>
+            </a:r>
+            <a:r>
+              <a:rPr lang="de-DE" dirty="0" err="1"/>
+              <a:t>of</a:t>
+            </a:r>
+            <a:r>
+              <a:rPr lang="de-DE" dirty="0"/>
+              <a:t> </a:t>
+            </a:r>
+            <a:r>
+              <a:rPr lang="de-DE" dirty="0" err="1"/>
+              <a:t>minority</a:t>
+            </a:r>
+            <a:r>
+              <a:rPr lang="de-DE" dirty="0"/>
+              <a:t> </a:t>
+            </a:r>
+            <a:r>
+              <a:rPr lang="de-DE" dirty="0" err="1"/>
+              <a:t>classes</a:t>
+            </a:r>
+            <a:r>
+              <a:rPr lang="de-DE" dirty="0"/>
+              <a:t> </a:t>
+            </a:r>
+            <a:r>
+              <a:rPr lang="de-DE" dirty="0" err="1"/>
+              <a:t>is</a:t>
+            </a:r>
+            <a:r>
+              <a:rPr lang="de-DE" dirty="0"/>
+              <a:t> </a:t>
+            </a:r>
+            <a:r>
+              <a:rPr lang="de-DE" dirty="0" err="1"/>
+              <a:t>poor</a:t>
+            </a:r>
+            <a:endParaRPr lang="de-DE" dirty="0"/>
+          </a:p>
+          <a:p>
+            <a:pPr lvl="1"/>
+            <a:r>
+              <a:rPr lang="de-DE" dirty="0"/>
+              <a:t>More </a:t>
+            </a:r>
+            <a:r>
+              <a:rPr lang="de-DE" dirty="0" err="1"/>
+              <a:t>cleaning</a:t>
+            </a:r>
+            <a:r>
+              <a:rPr lang="de-DE" dirty="0"/>
+              <a:t> </a:t>
+            </a:r>
+            <a:r>
+              <a:rPr lang="de-DE" dirty="0" err="1"/>
+              <a:t>of</a:t>
+            </a:r>
+            <a:r>
+              <a:rPr lang="de-DE" dirty="0"/>
+              <a:t> </a:t>
+            </a:r>
+            <a:r>
+              <a:rPr lang="de-DE" dirty="0" err="1"/>
+              <a:t>these</a:t>
+            </a:r>
+            <a:r>
+              <a:rPr lang="de-DE" dirty="0"/>
+              <a:t> </a:t>
+            </a:r>
+            <a:r>
+              <a:rPr lang="de-DE" dirty="0" err="1"/>
+              <a:t>genres</a:t>
+            </a:r>
+            <a:r>
+              <a:rPr lang="de-DE" dirty="0"/>
+              <a:t> </a:t>
+            </a:r>
+            <a:r>
+              <a:rPr lang="de-DE" dirty="0" err="1"/>
+              <a:t>is</a:t>
+            </a:r>
+            <a:r>
+              <a:rPr lang="de-DE" dirty="0"/>
+              <a:t> </a:t>
+            </a:r>
+            <a:r>
+              <a:rPr lang="de-DE" dirty="0" err="1"/>
+              <a:t>necessary</a:t>
+            </a:r>
+            <a:endParaRPr lang="de-DE" dirty="0"/>
+          </a:p>
+          <a:p>
+            <a:r>
+              <a:rPr lang="de-DE" dirty="0"/>
+              <a:t>Sample and </a:t>
+            </a:r>
+            <a:r>
+              <a:rPr lang="de-DE" dirty="0" err="1"/>
+              <a:t>weighted</a:t>
+            </a:r>
+            <a:r>
+              <a:rPr lang="de-DE" dirty="0"/>
+              <a:t> </a:t>
+            </a:r>
+            <a:r>
+              <a:rPr lang="de-DE" dirty="0" err="1"/>
+              <a:t>average</a:t>
+            </a:r>
+            <a:r>
+              <a:rPr lang="de-DE" dirty="0"/>
+              <a:t> </a:t>
+            </a:r>
+            <a:r>
+              <a:rPr lang="de-DE" dirty="0" err="1"/>
+              <a:t>may</a:t>
+            </a:r>
+            <a:r>
+              <a:rPr lang="de-DE" dirty="0"/>
+              <a:t> also </a:t>
+            </a:r>
+            <a:r>
+              <a:rPr lang="de-DE" dirty="0" err="1"/>
+              <a:t>improve</a:t>
+            </a:r>
+            <a:r>
+              <a:rPr lang="de-DE" dirty="0"/>
+              <a:t> </a:t>
+            </a:r>
+            <a:r>
+              <a:rPr lang="de-DE" dirty="0" err="1"/>
+              <a:t>with</a:t>
+            </a:r>
+            <a:r>
+              <a:rPr lang="de-DE" dirty="0"/>
+              <a:t> </a:t>
+            </a:r>
+            <a:r>
+              <a:rPr lang="de-DE" dirty="0" err="1"/>
+              <a:t>more</a:t>
+            </a:r>
+            <a:r>
+              <a:rPr lang="de-DE" dirty="0"/>
+              <a:t> </a:t>
+            </a:r>
+            <a:r>
+              <a:rPr lang="de-DE" dirty="0" err="1"/>
+              <a:t>genre</a:t>
+            </a:r>
+            <a:r>
+              <a:rPr lang="de-DE" dirty="0"/>
+              <a:t> </a:t>
+            </a:r>
+            <a:r>
+              <a:rPr lang="de-DE" dirty="0" err="1"/>
+              <a:t>cleaning</a:t>
+            </a:r>
+            <a:endParaRPr lang="de-DE" dirty="0"/>
+          </a:p>
+        </p:txBody>
+      </p:sp>
+      <p:pic>
+        <p:nvPicPr>
+          <p:cNvPr id="4" name="Grafik 3">
+            <a:extLst>
+              <a:ext uri="{FF2B5EF4-FFF2-40B4-BE49-F238E27FC236}">
+                <a16:creationId xmlns:a16="http://schemas.microsoft.com/office/drawing/2014/main" id="{4A0457CD-34EA-80D0-38BE-13B94319D967}"/>
+              </a:ext>
+            </a:extLst>
+          </p:cNvPr>
+          <p:cNvPicPr>
+            <a:picLocks noChangeAspect="1"/>
+          </p:cNvPicPr>
+          <p:nvPr/>
+        </p:nvPicPr>
+        <p:blipFill>
+          <a:blip r:embed="rId2"/>
+          <a:stretch>
+            <a:fillRect/>
+          </a:stretch>
+        </p:blipFill>
+        <p:spPr>
+          <a:xfrm>
+            <a:off x="653800" y="1540565"/>
+            <a:ext cx="3908259" cy="5020776"/>
+          </a:xfrm>
+          <a:prstGeom prst="rect">
+            <a:avLst/>
+          </a:prstGeom>
+        </p:spPr>
+      </p:pic>
+    </p:spTree>
+    <p:extLst>
+      <p:ext uri="{BB962C8B-B14F-4D97-AF65-F5344CB8AC3E}">
+        <p14:creationId xmlns:p14="http://schemas.microsoft.com/office/powerpoint/2010/main" val="3321152784"/>
       </p:ext>
     </p:extLst>
   </p:cSld>

</xml_diff>